<commit_message>
Update gitignore file + Add logos for readme and documentation
</commit_message>
<xml_diff>
--- a/doc/logo/generation.pptx
+++ b/doc/logo/generation.pptx
@@ -8,6 +8,8 @@
     <p:sldId id="256" r:id="rId2"/>
     <p:sldId id="257" r:id="rId3"/>
     <p:sldId id="258" r:id="rId4"/>
+    <p:sldId id="259" r:id="rId5"/>
+    <p:sldId id="260" r:id="rId6"/>
   </p:sldIdLst>
   <p:sldSz cx="12192000" cy="6858000"/>
   <p:notesSz cx="6858000" cy="9144000"/>
@@ -263,7 +265,7 @@
           <a:p>
             <a:fld id="{A8CCDDE5-D44E-4D2D-AEEB-047910BAF02C}" type="datetimeFigureOut">
               <a:rPr lang="en-US" smtClean="0"/>
-              <a:t>9/26/2019</a:t>
+              <a:t>10/16/2019</a:t>
             </a:fld>
             <a:endParaRPr lang="en-US"/>
           </a:p>
@@ -463,7 +465,7 @@
           <a:p>
             <a:fld id="{A8CCDDE5-D44E-4D2D-AEEB-047910BAF02C}" type="datetimeFigureOut">
               <a:rPr lang="en-US" smtClean="0"/>
-              <a:t>9/26/2019</a:t>
+              <a:t>10/16/2019</a:t>
             </a:fld>
             <a:endParaRPr lang="en-US"/>
           </a:p>
@@ -673,7 +675,7 @@
           <a:p>
             <a:fld id="{A8CCDDE5-D44E-4D2D-AEEB-047910BAF02C}" type="datetimeFigureOut">
               <a:rPr lang="en-US" smtClean="0"/>
-              <a:t>9/26/2019</a:t>
+              <a:t>10/16/2019</a:t>
             </a:fld>
             <a:endParaRPr lang="en-US"/>
           </a:p>
@@ -873,7 +875,7 @@
           <a:p>
             <a:fld id="{A8CCDDE5-D44E-4D2D-AEEB-047910BAF02C}" type="datetimeFigureOut">
               <a:rPr lang="en-US" smtClean="0"/>
-              <a:t>9/26/2019</a:t>
+              <a:t>10/16/2019</a:t>
             </a:fld>
             <a:endParaRPr lang="en-US"/>
           </a:p>
@@ -1149,7 +1151,7 @@
           <a:p>
             <a:fld id="{A8CCDDE5-D44E-4D2D-AEEB-047910BAF02C}" type="datetimeFigureOut">
               <a:rPr lang="en-US" smtClean="0"/>
-              <a:t>9/26/2019</a:t>
+              <a:t>10/16/2019</a:t>
             </a:fld>
             <a:endParaRPr lang="en-US"/>
           </a:p>
@@ -1417,7 +1419,7 @@
           <a:p>
             <a:fld id="{A8CCDDE5-D44E-4D2D-AEEB-047910BAF02C}" type="datetimeFigureOut">
               <a:rPr lang="en-US" smtClean="0"/>
-              <a:t>9/26/2019</a:t>
+              <a:t>10/16/2019</a:t>
             </a:fld>
             <a:endParaRPr lang="en-US"/>
           </a:p>
@@ -1832,7 +1834,7 @@
           <a:p>
             <a:fld id="{A8CCDDE5-D44E-4D2D-AEEB-047910BAF02C}" type="datetimeFigureOut">
               <a:rPr lang="en-US" smtClean="0"/>
-              <a:t>9/26/2019</a:t>
+              <a:t>10/16/2019</a:t>
             </a:fld>
             <a:endParaRPr lang="en-US"/>
           </a:p>
@@ -1974,7 +1976,7 @@
           <a:p>
             <a:fld id="{A8CCDDE5-D44E-4D2D-AEEB-047910BAF02C}" type="datetimeFigureOut">
               <a:rPr lang="en-US" smtClean="0"/>
-              <a:t>9/26/2019</a:t>
+              <a:t>10/16/2019</a:t>
             </a:fld>
             <a:endParaRPr lang="en-US"/>
           </a:p>
@@ -2087,7 +2089,7 @@
           <a:p>
             <a:fld id="{A8CCDDE5-D44E-4D2D-AEEB-047910BAF02C}" type="datetimeFigureOut">
               <a:rPr lang="en-US" smtClean="0"/>
-              <a:t>9/26/2019</a:t>
+              <a:t>10/16/2019</a:t>
             </a:fld>
             <a:endParaRPr lang="en-US"/>
           </a:p>
@@ -2400,7 +2402,7 @@
           <a:p>
             <a:fld id="{A8CCDDE5-D44E-4D2D-AEEB-047910BAF02C}" type="datetimeFigureOut">
               <a:rPr lang="en-US" smtClean="0"/>
-              <a:t>9/26/2019</a:t>
+              <a:t>10/16/2019</a:t>
             </a:fld>
             <a:endParaRPr lang="en-US"/>
           </a:p>
@@ -2689,7 +2691,7 @@
           <a:p>
             <a:fld id="{A8CCDDE5-D44E-4D2D-AEEB-047910BAF02C}" type="datetimeFigureOut">
               <a:rPr lang="en-US" smtClean="0"/>
-              <a:t>9/26/2019</a:t>
+              <a:t>10/16/2019</a:t>
             </a:fld>
             <a:endParaRPr lang="en-US"/>
           </a:p>
@@ -2932,7 +2934,7 @@
           <a:p>
             <a:fld id="{A8CCDDE5-D44E-4D2D-AEEB-047910BAF02C}" type="datetimeFigureOut">
               <a:rPr lang="en-US" smtClean="0"/>
-              <a:t>9/26/2019</a:t>
+              <a:t>10/16/2019</a:t>
             </a:fld>
             <a:endParaRPr lang="en-US"/>
           </a:p>
@@ -3399,8 +3401,8 @@
         </p:nvSpPr>
         <p:spPr>
           <a:xfrm>
-            <a:off x="1153474" y="1278419"/>
-            <a:ext cx="295274" cy="369332"/>
+            <a:off x="1124899" y="1297469"/>
+            <a:ext cx="351378" cy="369332"/>
           </a:xfrm>
           <a:prstGeom prst="rect">
             <a:avLst/>
@@ -3414,8 +3416,10 @@
           <a:lstStyle/>
           <a:p>
             <a:r>
-              <a:rPr lang="en-US" dirty="0"/>
-              <a:t>a</a:t>
+              <a:rPr lang="en-US" b="1" dirty="0">
+                <a:latin typeface="Arial Rounded MT Bold" panose="020F0704030504030204" pitchFamily="34" charset="0"/>
+              </a:rPr>
+              <a:t>A</a:t>
             </a:r>
           </a:p>
         </p:txBody>
@@ -3434,8 +3438,8 @@
         </p:nvSpPr>
         <p:spPr>
           <a:xfrm>
-            <a:off x="-622493" y="1292579"/>
-            <a:ext cx="306494" cy="369332"/>
+            <a:off x="-641543" y="1292579"/>
+            <a:ext cx="351378" cy="369332"/>
           </a:xfrm>
           <a:prstGeom prst="rect">
             <a:avLst/>
@@ -3449,8 +3453,10 @@
           <a:lstStyle/>
           <a:p>
             <a:r>
-              <a:rPr lang="en-US" dirty="0"/>
-              <a:t>b</a:t>
+              <a:rPr lang="en-US" dirty="0">
+                <a:latin typeface="Arial Rounded MT Bold" panose="020F0704030504030204" pitchFamily="34" charset="0"/>
+              </a:rPr>
+              <a:t>B</a:t>
             </a:r>
           </a:p>
         </p:txBody>
@@ -3573,8 +3579,8 @@
         </p:nvSpPr>
         <p:spPr>
           <a:xfrm>
-            <a:off x="-622493" y="3471741"/>
-            <a:ext cx="282450" cy="369332"/>
+            <a:off x="-651068" y="3500316"/>
+            <a:ext cx="356188" cy="369332"/>
           </a:xfrm>
           <a:prstGeom prst="rect">
             <a:avLst/>
@@ -3588,8 +3594,10 @@
           <a:lstStyle/>
           <a:p>
             <a:r>
-              <a:rPr lang="en-US" dirty="0"/>
-              <a:t>c</a:t>
+              <a:rPr lang="en-US" dirty="0">
+                <a:latin typeface="Arial Rounded MT Bold" panose="020F0704030504030204" pitchFamily="34" charset="0"/>
+              </a:rPr>
+              <a:t>C</a:t>
             </a:r>
           </a:p>
         </p:txBody>
@@ -3608,8 +3616,8 @@
         </p:nvSpPr>
         <p:spPr>
           <a:xfrm>
-            <a:off x="1153474" y="3490650"/>
-            <a:ext cx="306494" cy="369332"/>
+            <a:off x="1134424" y="3500175"/>
+            <a:ext cx="356188" cy="369332"/>
           </a:xfrm>
           <a:prstGeom prst="rect">
             <a:avLst/>
@@ -3623,8 +3631,10 @@
           <a:lstStyle/>
           <a:p>
             <a:r>
-              <a:rPr lang="en-US" dirty="0"/>
-              <a:t>d</a:t>
+              <a:rPr lang="en-US" dirty="0">
+                <a:latin typeface="Arial Rounded MT Bold" panose="020F0704030504030204" pitchFamily="34" charset="0"/>
+              </a:rPr>
+              <a:t>D</a:t>
             </a:r>
           </a:p>
         </p:txBody>
@@ -3643,7 +3653,7 @@
         </p:nvSpPr>
         <p:spPr>
           <a:xfrm>
-            <a:off x="1146061" y="2680693"/>
+            <a:off x="1127011" y="2690218"/>
             <a:ext cx="306494" cy="369332"/>
           </a:xfrm>
           <a:prstGeom prst="rect">
@@ -3658,8 +3668,10 @@
           <a:lstStyle/>
           <a:p>
             <a:r>
-              <a:rPr lang="en-US" dirty="0"/>
-              <a:t>e</a:t>
+              <a:rPr lang="en-US" dirty="0">
+                <a:latin typeface="Arial Rounded MT Bold" panose="020F0704030504030204" pitchFamily="34" charset="0"/>
+              </a:rPr>
+              <a:t>E</a:t>
             </a:r>
           </a:p>
         </p:txBody>
@@ -3679,7 +3691,7 @@
         <p:spPr>
           <a:xfrm>
             <a:off x="238228" y="2413317"/>
-            <a:ext cx="301686" cy="369332"/>
+            <a:ext cx="322524" cy="369332"/>
           </a:xfrm>
           <a:prstGeom prst="rect">
             <a:avLst/>
@@ -3693,7 +3705,9 @@
           <a:lstStyle/>
           <a:p>
             <a:r>
-              <a:rPr lang="en-US" dirty="0"/>
+              <a:rPr lang="en-US" dirty="0">
+                <a:latin typeface="Arial Rounded MT Bold" panose="020F0704030504030204" pitchFamily="34" charset="0"/>
+              </a:rPr>
               <a:t>1</a:t>
             </a:r>
           </a:p>
@@ -4085,82 +4099,192 @@
           </a:prstGeom>
         </p:spPr>
       </p:pic>
-      <p:sp>
-        <p:nvSpPr>
-          <p:cNvPr id="27" name="CasellaDiTesto 26">
-            <a:extLst>
-              <a:ext uri="{FF2B5EF4-FFF2-40B4-BE49-F238E27FC236}">
-                <a16:creationId xmlns:a16="http://schemas.microsoft.com/office/drawing/2014/main" id="{252EB884-43AC-4848-8A41-78B2C418890D}"/>
-              </a:ext>
-            </a:extLst>
-          </p:cNvPr>
-          <p:cNvSpPr txBox="1"/>
-          <p:nvPr/>
-        </p:nvSpPr>
-        <p:spPr>
-          <a:xfrm>
-            <a:off x="14701644" y="1297469"/>
-            <a:ext cx="330540" cy="369332"/>
-          </a:xfrm>
-          <a:prstGeom prst="rect">
-            <a:avLst/>
-          </a:prstGeom>
-          <a:noFill/>
-        </p:spPr>
-        <p:txBody>
-          <a:bodyPr wrap="none" rtlCol="0">
-            <a:spAutoFit/>
-          </a:bodyPr>
-          <a:lstStyle/>
-          <a:p>
-            <a:r>
-              <a:rPr lang="en-US" dirty="0"/>
-              <a:t>G</a:t>
-            </a:r>
-          </a:p>
-        </p:txBody>
-      </p:sp>
-      <p:sp>
-        <p:nvSpPr>
-          <p:cNvPr id="28" name="CasellaDiTesto 27">
-            <a:extLst>
-              <a:ext uri="{FF2B5EF4-FFF2-40B4-BE49-F238E27FC236}">
-                <a16:creationId xmlns:a16="http://schemas.microsoft.com/office/drawing/2014/main" id="{D30CD808-CB7D-47C9-80B7-44D4D56A3249}"/>
-              </a:ext>
-            </a:extLst>
-          </p:cNvPr>
-          <p:cNvSpPr txBox="1"/>
-          <p:nvPr/>
-        </p:nvSpPr>
-        <p:spPr>
-          <a:xfrm>
-            <a:off x="12944727" y="1311629"/>
-            <a:ext cx="309700" cy="369332"/>
-          </a:xfrm>
-          <a:prstGeom prst="rect">
-            <a:avLst/>
-          </a:prstGeom>
-          <a:noFill/>
-        </p:spPr>
-        <p:txBody>
-          <a:bodyPr wrap="none" rtlCol="0">
-            <a:spAutoFit/>
-          </a:bodyPr>
-          <a:lstStyle/>
-          <a:p>
-            <a:r>
-              <a:rPr lang="en-US" dirty="0"/>
-              <a:t>R</a:t>
-            </a:r>
-          </a:p>
-        </p:txBody>
-      </p:sp>
-      <p:sp>
-        <p:nvSpPr>
-          <p:cNvPr id="29" name="Ovale 28">
-            <a:extLst>
-              <a:ext uri="{FF2B5EF4-FFF2-40B4-BE49-F238E27FC236}">
-                <a16:creationId xmlns:a16="http://schemas.microsoft.com/office/drawing/2014/main" id="{D5B9C018-B199-4978-8045-07682CEE8B24}"/>
+      <p:pic>
+        <p:nvPicPr>
+          <p:cNvPr id="39" name="Immagine 38">
+            <a:extLst>
+              <a:ext uri="{FF2B5EF4-FFF2-40B4-BE49-F238E27FC236}">
+                <a16:creationId xmlns:a16="http://schemas.microsoft.com/office/drawing/2014/main" id="{8A42419F-CB1E-4D95-AA5C-7044596908B9}"/>
+              </a:ext>
+            </a:extLst>
+          </p:cNvPr>
+          <p:cNvPicPr>
+            <a:picLocks noChangeAspect="1"/>
+          </p:cNvPicPr>
+          <p:nvPr/>
+        </p:nvPicPr>
+        <p:blipFill>
+          <a:blip r:embed="rId3"/>
+          <a:stretch>
+            <a:fillRect/>
+          </a:stretch>
+        </p:blipFill>
+        <p:spPr>
+          <a:xfrm>
+            <a:off x="14771916" y="1330949"/>
+            <a:ext cx="178729" cy="298885"/>
+          </a:xfrm>
+          <a:prstGeom prst="rect">
+            <a:avLst/>
+          </a:prstGeom>
+        </p:spPr>
+      </p:pic>
+      <p:pic>
+        <p:nvPicPr>
+          <p:cNvPr id="40" name="Immagine 39">
+            <a:extLst>
+              <a:ext uri="{FF2B5EF4-FFF2-40B4-BE49-F238E27FC236}">
+                <a16:creationId xmlns:a16="http://schemas.microsoft.com/office/drawing/2014/main" id="{7470D98F-9718-415B-9176-2B735D608F46}"/>
+              </a:ext>
+            </a:extLst>
+          </p:cNvPr>
+          <p:cNvPicPr>
+            <a:picLocks noChangeAspect="1"/>
+          </p:cNvPicPr>
+          <p:nvPr/>
+        </p:nvPicPr>
+        <p:blipFill>
+          <a:blip r:embed="rId4"/>
+          <a:stretch>
+            <a:fillRect/>
+          </a:stretch>
+        </p:blipFill>
+        <p:spPr>
+          <a:xfrm>
+            <a:off x="12990712" y="1330948"/>
+            <a:ext cx="183087" cy="298885"/>
+          </a:xfrm>
+          <a:prstGeom prst="rect">
+            <a:avLst/>
+          </a:prstGeom>
+        </p:spPr>
+      </p:pic>
+      <p:pic>
+        <p:nvPicPr>
+          <p:cNvPr id="41" name="Immagine 40">
+            <a:extLst>
+              <a:ext uri="{FF2B5EF4-FFF2-40B4-BE49-F238E27FC236}">
+                <a16:creationId xmlns:a16="http://schemas.microsoft.com/office/drawing/2014/main" id="{D3E9522C-F8B3-44BF-9D5B-5E7482CAACCA}"/>
+              </a:ext>
+            </a:extLst>
+          </p:cNvPr>
+          <p:cNvPicPr>
+            <a:picLocks noChangeAspect="1"/>
+          </p:cNvPicPr>
+          <p:nvPr/>
+        </p:nvPicPr>
+        <p:blipFill>
+          <a:blip r:embed="rId5"/>
+          <a:stretch>
+            <a:fillRect/>
+          </a:stretch>
+        </p:blipFill>
+        <p:spPr>
+          <a:xfrm flipH="1">
+            <a:off x="13004002" y="3533854"/>
+            <a:ext cx="166923" cy="293661"/>
+          </a:xfrm>
+          <a:prstGeom prst="rect">
+            <a:avLst/>
+          </a:prstGeom>
+        </p:spPr>
+      </p:pic>
+      <p:pic>
+        <p:nvPicPr>
+          <p:cNvPr id="42" name="Immagine 41">
+            <a:extLst>
+              <a:ext uri="{FF2B5EF4-FFF2-40B4-BE49-F238E27FC236}">
+                <a16:creationId xmlns:a16="http://schemas.microsoft.com/office/drawing/2014/main" id="{0825C61F-595A-4959-A892-CC33406C77E4}"/>
+              </a:ext>
+            </a:extLst>
+          </p:cNvPr>
+          <p:cNvPicPr>
+            <a:picLocks noChangeAspect="1"/>
+          </p:cNvPicPr>
+          <p:nvPr/>
+        </p:nvPicPr>
+        <p:blipFill>
+          <a:blip r:embed="rId6"/>
+          <a:stretch>
+            <a:fillRect/>
+          </a:stretch>
+        </p:blipFill>
+        <p:spPr>
+          <a:xfrm>
+            <a:off x="14774578" y="3515566"/>
+            <a:ext cx="181673" cy="307076"/>
+          </a:xfrm>
+          <a:prstGeom prst="rect">
+            <a:avLst/>
+          </a:prstGeom>
+        </p:spPr>
+      </p:pic>
+      <p:pic>
+        <p:nvPicPr>
+          <p:cNvPr id="43" name="Immagine 42">
+            <a:extLst>
+              <a:ext uri="{FF2B5EF4-FFF2-40B4-BE49-F238E27FC236}">
+                <a16:creationId xmlns:a16="http://schemas.microsoft.com/office/drawing/2014/main" id="{DF9AB7E0-C54B-4FA9-8D5E-E4544B0E9557}"/>
+              </a:ext>
+            </a:extLst>
+          </p:cNvPr>
+          <p:cNvPicPr>
+            <a:picLocks noChangeAspect="1"/>
+          </p:cNvPicPr>
+          <p:nvPr/>
+        </p:nvPicPr>
+        <p:blipFill>
+          <a:blip r:embed="rId7"/>
+          <a:stretch>
+            <a:fillRect/>
+          </a:stretch>
+        </p:blipFill>
+        <p:spPr>
+          <a:xfrm>
+            <a:off x="14774578" y="2727324"/>
+            <a:ext cx="166923" cy="307076"/>
+          </a:xfrm>
+          <a:prstGeom prst="rect">
+            <a:avLst/>
+          </a:prstGeom>
+        </p:spPr>
+      </p:pic>
+      <p:pic>
+        <p:nvPicPr>
+          <p:cNvPr id="44" name="Immagine 43">
+            <a:extLst>
+              <a:ext uri="{FF2B5EF4-FFF2-40B4-BE49-F238E27FC236}">
+                <a16:creationId xmlns:a16="http://schemas.microsoft.com/office/drawing/2014/main" id="{4A856B63-3002-4B5F-82C2-A7FBD77A6C7D}"/>
+              </a:ext>
+            </a:extLst>
+          </p:cNvPr>
+          <p:cNvPicPr>
+            <a:picLocks noChangeAspect="1"/>
+          </p:cNvPicPr>
+          <p:nvPr/>
+        </p:nvPicPr>
+        <p:blipFill>
+          <a:blip r:embed="rId8"/>
+          <a:stretch>
+            <a:fillRect/>
+          </a:stretch>
+        </p:blipFill>
+        <p:spPr>
+          <a:xfrm>
+            <a:off x="13715375" y="2347921"/>
+            <a:ext cx="348097" cy="213485"/>
+          </a:xfrm>
+          <a:prstGeom prst="rect">
+            <a:avLst/>
+          </a:prstGeom>
+        </p:spPr>
+      </p:pic>
+      <p:sp>
+        <p:nvSpPr>
+          <p:cNvPr id="6" name="Rettangolo 5">
+            <a:extLst>
+              <a:ext uri="{FF2B5EF4-FFF2-40B4-BE49-F238E27FC236}">
+                <a16:creationId xmlns:a16="http://schemas.microsoft.com/office/drawing/2014/main" id="{A4716F35-C599-4E5D-8D9F-509643F46A34}"/>
               </a:ext>
             </a:extLst>
           </p:cNvPr>
@@ -4169,14 +4293,14 @@
         </p:nvSpPr>
         <p:spPr>
           <a:xfrm>
-            <a:off x="13627185" y="2181073"/>
-            <a:ext cx="537328" cy="537328"/>
-          </a:xfrm>
-          <a:prstGeom prst="ellipse">
+            <a:off x="10590221" y="5138592"/>
+            <a:ext cx="6765091" cy="1533739"/>
+          </a:xfrm>
+          <a:prstGeom prst="rect">
             <a:avLst/>
           </a:prstGeom>
           <a:solidFill>
-            <a:srgbClr val="3CAB73"/>
+            <a:schemeClr val="bg1"/>
           </a:solidFill>
           <a:ln>
             <a:noFill/>
@@ -4203,202 +4327,91 @@
           <a:lstStyle/>
           <a:p>
             <a:pPr algn="ctr"/>
-            <a:endParaRPr lang="en-US"/>
-          </a:p>
-        </p:txBody>
-      </p:sp>
-      <p:sp>
-        <p:nvSpPr>
-          <p:cNvPr id="30" name="Rettangolo 29">
-            <a:extLst>
-              <a:ext uri="{FF2B5EF4-FFF2-40B4-BE49-F238E27FC236}">
-                <a16:creationId xmlns:a16="http://schemas.microsoft.com/office/drawing/2014/main" id="{D2D76A7E-04FE-468F-89E1-D5503EAAE4BA}"/>
-              </a:ext>
-            </a:extLst>
-          </p:cNvPr>
-          <p:cNvSpPr/>
-          <p:nvPr/>
-        </p:nvSpPr>
-        <p:spPr>
-          <a:xfrm>
-            <a:off x="13617758" y="2376716"/>
-            <a:ext cx="678731" cy="470181"/>
-          </a:xfrm>
-          <a:prstGeom prst="rect">
-            <a:avLst/>
-          </a:prstGeom>
-          <a:solidFill>
-            <a:schemeClr val="bg1"/>
-          </a:solidFill>
-          <a:ln>
-            <a:noFill/>
-          </a:ln>
-        </p:spPr>
-        <p:style>
-          <a:lnRef idx="2">
-            <a:schemeClr val="accent1">
-              <a:shade val="50000"/>
-            </a:schemeClr>
-          </a:lnRef>
-          <a:fillRef idx="1">
-            <a:schemeClr val="accent1"/>
-          </a:fillRef>
-          <a:effectRef idx="0">
-            <a:schemeClr val="accent1"/>
-          </a:effectRef>
-          <a:fontRef idx="minor">
-            <a:schemeClr val="lt1"/>
-          </a:fontRef>
-        </p:style>
-        <p:txBody>
-          <a:bodyPr rtlCol="0" anchor="ctr"/>
-          <a:lstStyle/>
-          <a:p>
-            <a:pPr algn="ctr"/>
-            <a:endParaRPr lang="en-US"/>
-          </a:p>
-        </p:txBody>
-      </p:sp>
-      <p:sp>
-        <p:nvSpPr>
-          <p:cNvPr id="31" name="CasellaDiTesto 30">
-            <a:extLst>
-              <a:ext uri="{FF2B5EF4-FFF2-40B4-BE49-F238E27FC236}">
-                <a16:creationId xmlns:a16="http://schemas.microsoft.com/office/drawing/2014/main" id="{68DF60D4-81D3-4FC6-8C83-958D301B0CCF}"/>
-              </a:ext>
-            </a:extLst>
-          </p:cNvPr>
-          <p:cNvSpPr txBox="1"/>
-          <p:nvPr/>
-        </p:nvSpPr>
-        <p:spPr>
-          <a:xfrm>
-            <a:off x="12925677" y="3490791"/>
-            <a:ext cx="317716" cy="369332"/>
-          </a:xfrm>
-          <a:prstGeom prst="rect">
-            <a:avLst/>
-          </a:prstGeom>
-          <a:noFill/>
-        </p:spPr>
-        <p:txBody>
-          <a:bodyPr wrap="none" rtlCol="0">
-            <a:spAutoFit/>
-          </a:bodyPr>
-          <a:lstStyle/>
-          <a:p>
-            <a:r>
-              <a:rPr lang="en-US" dirty="0"/>
-              <a:t>A</a:t>
-            </a:r>
-          </a:p>
-        </p:txBody>
-      </p:sp>
-      <p:sp>
-        <p:nvSpPr>
-          <p:cNvPr id="32" name="CasellaDiTesto 31">
-            <a:extLst>
-              <a:ext uri="{FF2B5EF4-FFF2-40B4-BE49-F238E27FC236}">
-                <a16:creationId xmlns:a16="http://schemas.microsoft.com/office/drawing/2014/main" id="{2A9D5AF6-8454-4295-92A4-F2ED2089B90F}"/>
-              </a:ext>
-            </a:extLst>
-          </p:cNvPr>
-          <p:cNvSpPr txBox="1"/>
-          <p:nvPr/>
-        </p:nvSpPr>
-        <p:spPr>
-          <a:xfrm>
-            <a:off x="14720694" y="3490650"/>
-            <a:ext cx="303288" cy="369332"/>
-          </a:xfrm>
-          <a:prstGeom prst="rect">
-            <a:avLst/>
-          </a:prstGeom>
-          <a:noFill/>
-        </p:spPr>
-        <p:txBody>
-          <a:bodyPr wrap="none" rtlCol="0">
-            <a:spAutoFit/>
-          </a:bodyPr>
-          <a:lstStyle/>
-          <a:p>
-            <a:r>
-              <a:rPr lang="en-US" dirty="0"/>
-              <a:t>P</a:t>
-            </a:r>
-          </a:p>
-        </p:txBody>
-      </p:sp>
-      <p:sp>
-        <p:nvSpPr>
-          <p:cNvPr id="33" name="CasellaDiTesto 32">
-            <a:extLst>
-              <a:ext uri="{FF2B5EF4-FFF2-40B4-BE49-F238E27FC236}">
-                <a16:creationId xmlns:a16="http://schemas.microsoft.com/office/drawing/2014/main" id="{3AC6D0FB-AE42-4369-B45F-63897016BEE0}"/>
-              </a:ext>
-            </a:extLst>
-          </p:cNvPr>
-          <p:cNvSpPr txBox="1"/>
-          <p:nvPr/>
-        </p:nvSpPr>
-        <p:spPr>
-          <a:xfrm>
-            <a:off x="14694231" y="2699743"/>
-            <a:ext cx="306494" cy="369332"/>
-          </a:xfrm>
-          <a:prstGeom prst="rect">
-            <a:avLst/>
-          </a:prstGeom>
-          <a:noFill/>
-        </p:spPr>
-        <p:txBody>
-          <a:bodyPr wrap="square" rtlCol="0">
-            <a:spAutoFit/>
-          </a:bodyPr>
-          <a:lstStyle/>
-          <a:p>
-            <a:r>
-              <a:rPr lang="en-US" dirty="0"/>
-              <a:t>H</a:t>
-            </a:r>
-          </a:p>
-        </p:txBody>
-      </p:sp>
-      <p:sp>
-        <p:nvSpPr>
-          <p:cNvPr id="34" name="CasellaDiTesto 33">
-            <a:extLst>
-              <a:ext uri="{FF2B5EF4-FFF2-40B4-BE49-F238E27FC236}">
-                <a16:creationId xmlns:a16="http://schemas.microsoft.com/office/drawing/2014/main" id="{4F453709-3104-4E70-B696-81D065421856}"/>
-              </a:ext>
-            </a:extLst>
-          </p:cNvPr>
-          <p:cNvSpPr txBox="1"/>
-          <p:nvPr/>
-        </p:nvSpPr>
-        <p:spPr>
-          <a:xfrm>
-            <a:off x="13654527" y="2437184"/>
-            <a:ext cx="591829" cy="369332"/>
-          </a:xfrm>
-          <a:prstGeom prst="rect">
-            <a:avLst/>
-          </a:prstGeom>
-          <a:noFill/>
-        </p:spPr>
-        <p:txBody>
-          <a:bodyPr wrap="none" rtlCol="0">
-            <a:spAutoFit/>
-          </a:bodyPr>
-          <a:lstStyle/>
-          <a:p>
-            <a:r>
-              <a:rPr lang="en-US" dirty="0"/>
-              <a:t>GEN</a:t>
-            </a:r>
-          </a:p>
-        </p:txBody>
-      </p:sp>
+            <a:endParaRPr lang="en-US" dirty="0"/>
+          </a:p>
+        </p:txBody>
+      </p:sp>
+      <p:grpSp>
+        <p:nvGrpSpPr>
+          <p:cNvPr id="7" name="Gruppo 6">
+            <a:extLst>
+              <a:ext uri="{FF2B5EF4-FFF2-40B4-BE49-F238E27FC236}">
+                <a16:creationId xmlns:a16="http://schemas.microsoft.com/office/drawing/2014/main" id="{5E069B96-2DE4-4C46-8C9B-4E5F7A1B6FCD}"/>
+              </a:ext>
+            </a:extLst>
+          </p:cNvPr>
+          <p:cNvGrpSpPr/>
+          <p:nvPr/>
+        </p:nvGrpSpPr>
+        <p:grpSpPr>
+          <a:xfrm>
+            <a:off x="11024048" y="4943896"/>
+            <a:ext cx="6122157" cy="1609950"/>
+            <a:chOff x="11014621" y="4943896"/>
+            <a:chExt cx="6122157" cy="1609950"/>
+          </a:xfrm>
+        </p:grpSpPr>
+        <p:pic>
+          <p:nvPicPr>
+            <p:cNvPr id="3" name="Immagine 2">
+              <a:extLst>
+                <a:ext uri="{FF2B5EF4-FFF2-40B4-BE49-F238E27FC236}">
+                  <a16:creationId xmlns:a16="http://schemas.microsoft.com/office/drawing/2014/main" id="{E3E12438-99BE-42DB-9402-952CF79C8B9E}"/>
+                </a:ext>
+              </a:extLst>
+            </p:cNvPr>
+            <p:cNvPicPr>
+              <a:picLocks noChangeAspect="1"/>
+            </p:cNvPicPr>
+            <p:nvPr/>
+          </p:nvPicPr>
+          <p:blipFill>
+            <a:blip r:embed="rId9"/>
+            <a:stretch>
+              <a:fillRect/>
+            </a:stretch>
+          </p:blipFill>
+          <p:spPr>
+            <a:xfrm>
+              <a:off x="14821880" y="5009419"/>
+              <a:ext cx="2314898" cy="1533739"/>
+            </a:xfrm>
+            <a:prstGeom prst="rect">
+              <a:avLst/>
+            </a:prstGeom>
+          </p:spPr>
+        </p:pic>
+        <p:pic>
+          <p:nvPicPr>
+            <p:cNvPr id="4" name="Immagine 3">
+              <a:extLst>
+                <a:ext uri="{FF2B5EF4-FFF2-40B4-BE49-F238E27FC236}">
+                  <a16:creationId xmlns:a16="http://schemas.microsoft.com/office/drawing/2014/main" id="{E331DC89-C496-482C-B5DB-794D64D3DA9D}"/>
+                </a:ext>
+              </a:extLst>
+            </p:cNvPr>
+            <p:cNvPicPr>
+              <a:picLocks noChangeAspect="1"/>
+            </p:cNvPicPr>
+            <p:nvPr/>
+          </p:nvPicPr>
+          <p:blipFill>
+            <a:blip r:embed="rId10"/>
+            <a:stretch>
+              <a:fillRect/>
+            </a:stretch>
+          </p:blipFill>
+          <p:spPr>
+            <a:xfrm>
+              <a:off x="11014621" y="4943896"/>
+              <a:ext cx="3820058" cy="1609950"/>
+            </a:xfrm>
+            <a:prstGeom prst="rect">
+              <a:avLst/>
+            </a:prstGeom>
+          </p:spPr>
+        </p:pic>
+      </p:grpSp>
     </p:spTree>
     <p:extLst>
       <p:ext uri="{BB962C8B-B14F-4D97-AF65-F5344CB8AC3E}">
@@ -7891,76 +7904,6 @@
       </p:sp>
       <p:sp>
         <p:nvSpPr>
-          <p:cNvPr id="49" name="CasellaDiTesto 48">
-            <a:extLst>
-              <a:ext uri="{FF2B5EF4-FFF2-40B4-BE49-F238E27FC236}">
-                <a16:creationId xmlns:a16="http://schemas.microsoft.com/office/drawing/2014/main" id="{FC1D0446-B22B-451B-87E8-9CE89F9F019C}"/>
-              </a:ext>
-            </a:extLst>
-          </p:cNvPr>
-          <p:cNvSpPr txBox="1"/>
-          <p:nvPr/>
-        </p:nvSpPr>
-        <p:spPr>
-          <a:xfrm>
-            <a:off x="11748894" y="1411769"/>
-            <a:ext cx="330540" cy="369332"/>
-          </a:xfrm>
-          <a:prstGeom prst="rect">
-            <a:avLst/>
-          </a:prstGeom>
-          <a:noFill/>
-        </p:spPr>
-        <p:txBody>
-          <a:bodyPr wrap="none" rtlCol="0">
-            <a:spAutoFit/>
-          </a:bodyPr>
-          <a:lstStyle/>
-          <a:p>
-            <a:r>
-              <a:rPr lang="en-US" dirty="0"/>
-              <a:t>G</a:t>
-            </a:r>
-          </a:p>
-        </p:txBody>
-      </p:sp>
-      <p:sp>
-        <p:nvSpPr>
-          <p:cNvPr id="50" name="CasellaDiTesto 49">
-            <a:extLst>
-              <a:ext uri="{FF2B5EF4-FFF2-40B4-BE49-F238E27FC236}">
-                <a16:creationId xmlns:a16="http://schemas.microsoft.com/office/drawing/2014/main" id="{029870D4-E2E9-4414-9004-857F3BFF35D9}"/>
-              </a:ext>
-            </a:extLst>
-          </p:cNvPr>
-          <p:cNvSpPr txBox="1"/>
-          <p:nvPr/>
-        </p:nvSpPr>
-        <p:spPr>
-          <a:xfrm>
-            <a:off x="9991977" y="1425929"/>
-            <a:ext cx="309700" cy="369332"/>
-          </a:xfrm>
-          <a:prstGeom prst="rect">
-            <a:avLst/>
-          </a:prstGeom>
-          <a:noFill/>
-        </p:spPr>
-        <p:txBody>
-          <a:bodyPr wrap="none" rtlCol="0">
-            <a:spAutoFit/>
-          </a:bodyPr>
-          <a:lstStyle/>
-          <a:p>
-            <a:r>
-              <a:rPr lang="en-US" dirty="0"/>
-              <a:t>R</a:t>
-            </a:r>
-          </a:p>
-        </p:txBody>
-      </p:sp>
-      <p:sp>
-        <p:nvSpPr>
           <p:cNvPr id="51" name="Ovale 50">
             <a:extLst>
               <a:ext uri="{FF2B5EF4-FFF2-40B4-BE49-F238E27FC236}">
@@ -8063,150 +8006,1338 @@
           </a:p>
         </p:txBody>
       </p:sp>
-      <p:sp>
-        <p:nvSpPr>
-          <p:cNvPr id="53" name="CasellaDiTesto 52">
-            <a:extLst>
-              <a:ext uri="{FF2B5EF4-FFF2-40B4-BE49-F238E27FC236}">
-                <a16:creationId xmlns:a16="http://schemas.microsoft.com/office/drawing/2014/main" id="{283F7FC3-6BAE-4A5E-85CE-E556CF14ADF1}"/>
-              </a:ext>
-            </a:extLst>
-          </p:cNvPr>
-          <p:cNvSpPr txBox="1"/>
-          <p:nvPr/>
-        </p:nvSpPr>
-        <p:spPr>
-          <a:xfrm>
-            <a:off x="9972927" y="3605091"/>
-            <a:ext cx="317716" cy="369332"/>
-          </a:xfrm>
-          <a:prstGeom prst="rect">
-            <a:avLst/>
-          </a:prstGeom>
-          <a:noFill/>
-        </p:spPr>
-        <p:txBody>
-          <a:bodyPr wrap="none" rtlCol="0">
-            <a:spAutoFit/>
-          </a:bodyPr>
-          <a:lstStyle/>
-          <a:p>
-            <a:r>
-              <a:rPr lang="en-US" dirty="0"/>
-              <a:t>A</a:t>
-            </a:r>
-          </a:p>
-        </p:txBody>
-      </p:sp>
-      <p:sp>
-        <p:nvSpPr>
-          <p:cNvPr id="54" name="CasellaDiTesto 53">
-            <a:extLst>
-              <a:ext uri="{FF2B5EF4-FFF2-40B4-BE49-F238E27FC236}">
-                <a16:creationId xmlns:a16="http://schemas.microsoft.com/office/drawing/2014/main" id="{CCAD21E8-9CD5-486D-91B4-0E8EF7AAC29A}"/>
-              </a:ext>
-            </a:extLst>
-          </p:cNvPr>
-          <p:cNvSpPr txBox="1"/>
-          <p:nvPr/>
-        </p:nvSpPr>
-        <p:spPr>
-          <a:xfrm>
-            <a:off x="11767944" y="3604950"/>
-            <a:ext cx="303288" cy="369332"/>
-          </a:xfrm>
-          <a:prstGeom prst="rect">
-            <a:avLst/>
-          </a:prstGeom>
-          <a:noFill/>
-        </p:spPr>
-        <p:txBody>
-          <a:bodyPr wrap="none" rtlCol="0">
-            <a:spAutoFit/>
-          </a:bodyPr>
-          <a:lstStyle/>
-          <a:p>
-            <a:r>
-              <a:rPr lang="en-US" dirty="0"/>
-              <a:t>P</a:t>
-            </a:r>
-          </a:p>
-        </p:txBody>
-      </p:sp>
-      <p:sp>
-        <p:nvSpPr>
-          <p:cNvPr id="55" name="CasellaDiTesto 54">
-            <a:extLst>
-              <a:ext uri="{FF2B5EF4-FFF2-40B4-BE49-F238E27FC236}">
-                <a16:creationId xmlns:a16="http://schemas.microsoft.com/office/drawing/2014/main" id="{C2FEC8CE-C24D-4AFE-8FE9-01DA902B3A53}"/>
-              </a:ext>
-            </a:extLst>
-          </p:cNvPr>
-          <p:cNvSpPr txBox="1"/>
-          <p:nvPr/>
-        </p:nvSpPr>
-        <p:spPr>
-          <a:xfrm>
-            <a:off x="11741481" y="2814043"/>
-            <a:ext cx="306494" cy="369332"/>
-          </a:xfrm>
-          <a:prstGeom prst="rect">
-            <a:avLst/>
-          </a:prstGeom>
-          <a:noFill/>
-        </p:spPr>
-        <p:txBody>
-          <a:bodyPr wrap="square" rtlCol="0">
-            <a:spAutoFit/>
-          </a:bodyPr>
-          <a:lstStyle/>
-          <a:p>
-            <a:r>
-              <a:rPr lang="en-US" dirty="0"/>
-              <a:t>H</a:t>
-            </a:r>
-          </a:p>
-        </p:txBody>
-      </p:sp>
-      <p:sp>
-        <p:nvSpPr>
-          <p:cNvPr id="56" name="CasellaDiTesto 55">
-            <a:extLst>
-              <a:ext uri="{FF2B5EF4-FFF2-40B4-BE49-F238E27FC236}">
-                <a16:creationId xmlns:a16="http://schemas.microsoft.com/office/drawing/2014/main" id="{D659FDC2-0494-4F82-A748-8ACC5BBADDBC}"/>
-              </a:ext>
-            </a:extLst>
-          </p:cNvPr>
-          <p:cNvSpPr txBox="1"/>
-          <p:nvPr/>
-        </p:nvSpPr>
-        <p:spPr>
-          <a:xfrm>
-            <a:off x="10701777" y="2551484"/>
-            <a:ext cx="591829" cy="369332"/>
-          </a:xfrm>
-          <a:prstGeom prst="rect">
-            <a:avLst/>
-          </a:prstGeom>
-          <a:noFill/>
-        </p:spPr>
-        <p:txBody>
-          <a:bodyPr wrap="none" rtlCol="0">
-            <a:spAutoFit/>
-          </a:bodyPr>
-          <a:lstStyle/>
-          <a:p>
-            <a:r>
-              <a:rPr lang="en-US" dirty="0"/>
-              <a:t>GEN</a:t>
-            </a:r>
-          </a:p>
-        </p:txBody>
-      </p:sp>
+      <p:pic>
+        <p:nvPicPr>
+          <p:cNvPr id="2" name="Immagine 1">
+            <a:extLst>
+              <a:ext uri="{FF2B5EF4-FFF2-40B4-BE49-F238E27FC236}">
+                <a16:creationId xmlns:a16="http://schemas.microsoft.com/office/drawing/2014/main" id="{F48E4010-1495-4CE2-9905-1F67E5862EB6}"/>
+              </a:ext>
+            </a:extLst>
+          </p:cNvPr>
+          <p:cNvPicPr>
+            <a:picLocks noChangeAspect="1"/>
+          </p:cNvPicPr>
+          <p:nvPr/>
+        </p:nvPicPr>
+        <p:blipFill>
+          <a:blip r:embed="rId3"/>
+          <a:stretch>
+            <a:fillRect/>
+          </a:stretch>
+        </p:blipFill>
+        <p:spPr>
+          <a:xfrm>
+            <a:off x="11827548" y="1458965"/>
+            <a:ext cx="178729" cy="298885"/>
+          </a:xfrm>
+          <a:prstGeom prst="rect">
+            <a:avLst/>
+          </a:prstGeom>
+        </p:spPr>
+      </p:pic>
+      <p:pic>
+        <p:nvPicPr>
+          <p:cNvPr id="3" name="Immagine 2">
+            <a:extLst>
+              <a:ext uri="{FF2B5EF4-FFF2-40B4-BE49-F238E27FC236}">
+                <a16:creationId xmlns:a16="http://schemas.microsoft.com/office/drawing/2014/main" id="{C8AB9285-95E3-4E87-9D87-7E63527FA018}"/>
+              </a:ext>
+            </a:extLst>
+          </p:cNvPr>
+          <p:cNvPicPr>
+            <a:picLocks noChangeAspect="1"/>
+          </p:cNvPicPr>
+          <p:nvPr/>
+        </p:nvPicPr>
+        <p:blipFill>
+          <a:blip r:embed="rId4"/>
+          <a:stretch>
+            <a:fillRect/>
+          </a:stretch>
+        </p:blipFill>
+        <p:spPr>
+          <a:xfrm>
+            <a:off x="10046344" y="1458964"/>
+            <a:ext cx="183087" cy="298885"/>
+          </a:xfrm>
+          <a:prstGeom prst="rect">
+            <a:avLst/>
+          </a:prstGeom>
+        </p:spPr>
+      </p:pic>
+      <p:pic>
+        <p:nvPicPr>
+          <p:cNvPr id="4" name="Immagine 3">
+            <a:extLst>
+              <a:ext uri="{FF2B5EF4-FFF2-40B4-BE49-F238E27FC236}">
+                <a16:creationId xmlns:a16="http://schemas.microsoft.com/office/drawing/2014/main" id="{3BD1057A-F514-4847-A35F-E7798CD09954}"/>
+              </a:ext>
+            </a:extLst>
+          </p:cNvPr>
+          <p:cNvPicPr>
+            <a:picLocks noChangeAspect="1"/>
+          </p:cNvPicPr>
+          <p:nvPr/>
+        </p:nvPicPr>
+        <p:blipFill>
+          <a:blip r:embed="rId5"/>
+          <a:stretch>
+            <a:fillRect/>
+          </a:stretch>
+        </p:blipFill>
+        <p:spPr>
+          <a:xfrm flipH="1">
+            <a:off x="10059634" y="3661870"/>
+            <a:ext cx="166923" cy="293661"/>
+          </a:xfrm>
+          <a:prstGeom prst="rect">
+            <a:avLst/>
+          </a:prstGeom>
+        </p:spPr>
+      </p:pic>
+      <p:pic>
+        <p:nvPicPr>
+          <p:cNvPr id="6" name="Immagine 5">
+            <a:extLst>
+              <a:ext uri="{FF2B5EF4-FFF2-40B4-BE49-F238E27FC236}">
+                <a16:creationId xmlns:a16="http://schemas.microsoft.com/office/drawing/2014/main" id="{89D31669-2821-4134-B1AE-EBB74820B044}"/>
+              </a:ext>
+            </a:extLst>
+          </p:cNvPr>
+          <p:cNvPicPr>
+            <a:picLocks noChangeAspect="1"/>
+          </p:cNvPicPr>
+          <p:nvPr/>
+        </p:nvPicPr>
+        <p:blipFill>
+          <a:blip r:embed="rId6"/>
+          <a:stretch>
+            <a:fillRect/>
+          </a:stretch>
+        </p:blipFill>
+        <p:spPr>
+          <a:xfrm>
+            <a:off x="11830210" y="3643582"/>
+            <a:ext cx="181673" cy="307076"/>
+          </a:xfrm>
+          <a:prstGeom prst="rect">
+            <a:avLst/>
+          </a:prstGeom>
+        </p:spPr>
+      </p:pic>
+      <p:pic>
+        <p:nvPicPr>
+          <p:cNvPr id="7" name="Immagine 6">
+            <a:extLst>
+              <a:ext uri="{FF2B5EF4-FFF2-40B4-BE49-F238E27FC236}">
+                <a16:creationId xmlns:a16="http://schemas.microsoft.com/office/drawing/2014/main" id="{4E238F53-1A74-4473-9215-A45E7BFF12D4}"/>
+              </a:ext>
+            </a:extLst>
+          </p:cNvPr>
+          <p:cNvPicPr>
+            <a:picLocks noChangeAspect="1"/>
+          </p:cNvPicPr>
+          <p:nvPr/>
+        </p:nvPicPr>
+        <p:blipFill>
+          <a:blip r:embed="rId7"/>
+          <a:stretch>
+            <a:fillRect/>
+          </a:stretch>
+        </p:blipFill>
+        <p:spPr>
+          <a:xfrm>
+            <a:off x="11830210" y="2855340"/>
+            <a:ext cx="166923" cy="307076"/>
+          </a:xfrm>
+          <a:prstGeom prst="rect">
+            <a:avLst/>
+          </a:prstGeom>
+        </p:spPr>
+      </p:pic>
+      <p:pic>
+        <p:nvPicPr>
+          <p:cNvPr id="17" name="Immagine 16">
+            <a:extLst>
+              <a:ext uri="{FF2B5EF4-FFF2-40B4-BE49-F238E27FC236}">
+                <a16:creationId xmlns:a16="http://schemas.microsoft.com/office/drawing/2014/main" id="{0F1B8BFC-DC64-4A70-BF73-F6B0E7F43D03}"/>
+              </a:ext>
+            </a:extLst>
+          </p:cNvPr>
+          <p:cNvPicPr>
+            <a:picLocks noChangeAspect="1"/>
+          </p:cNvPicPr>
+          <p:nvPr/>
+        </p:nvPicPr>
+        <p:blipFill>
+          <a:blip r:embed="rId8"/>
+          <a:stretch>
+            <a:fillRect/>
+          </a:stretch>
+        </p:blipFill>
+        <p:spPr>
+          <a:xfrm>
+            <a:off x="10746943" y="2586754"/>
+            <a:ext cx="499621" cy="306414"/>
+          </a:xfrm>
+          <a:prstGeom prst="rect">
+            <a:avLst/>
+          </a:prstGeom>
+        </p:spPr>
+      </p:pic>
     </p:spTree>
     <p:extLst>
       <p:ext uri="{BB962C8B-B14F-4D97-AF65-F5344CB8AC3E}">
         <p14:creationId xmlns:p14="http://schemas.microsoft.com/office/powerpoint/2010/main" val="4289722364"/>
+      </p:ext>
+    </p:extLst>
+  </p:cSld>
+  <p:clrMapOvr>
+    <a:masterClrMapping/>
+  </p:clrMapOvr>
+</p:sld>
+</file>
+
+<file path=ppt/slides/slide4.xml><?xml version="1.0" encoding="utf-8"?>
+<p:sld xmlns:a="http://schemas.openxmlformats.org/drawingml/2006/main" xmlns:r="http://schemas.openxmlformats.org/officeDocument/2006/relationships" xmlns:p="http://schemas.openxmlformats.org/presentationml/2006/main">
+  <p:cSld>
+    <p:spTree>
+      <p:nvGrpSpPr>
+        <p:cNvPr id="1" name=""/>
+        <p:cNvGrpSpPr/>
+        <p:nvPr/>
+      </p:nvGrpSpPr>
+      <p:grpSpPr>
+        <a:xfrm>
+          <a:off x="0" y="0"/>
+          <a:ext cx="0" cy="0"/>
+          <a:chOff x="0" y="0"/>
+          <a:chExt cx="0" cy="0"/>
+        </a:xfrm>
+      </p:grpSpPr>
+      <p:pic>
+        <p:nvPicPr>
+          <p:cNvPr id="4" name="Immagine 3" descr="Immagine che contiene oggetto&#10;&#10;Descrizione generata automaticamente">
+            <a:extLst>
+              <a:ext uri="{FF2B5EF4-FFF2-40B4-BE49-F238E27FC236}">
+                <a16:creationId xmlns:a16="http://schemas.microsoft.com/office/drawing/2014/main" id="{F6907E33-2699-40F3-BC16-7A4F5F2B0E13}"/>
+              </a:ext>
+            </a:extLst>
+          </p:cNvPr>
+          <p:cNvPicPr>
+            <a:picLocks noChangeAspect="1"/>
+          </p:cNvPicPr>
+          <p:nvPr/>
+        </p:nvPicPr>
+        <p:blipFill>
+          <a:blip r:embed="rId2">
+            <a:extLst>
+              <a:ext uri="{28A0092B-C50C-407E-A947-70E740481C1C}">
+                <a14:useLocalDpi xmlns:a14="http://schemas.microsoft.com/office/drawing/2010/main" val="0"/>
+              </a:ext>
+            </a:extLst>
+          </a:blip>
+          <a:stretch>
+            <a:fillRect/>
+          </a:stretch>
+        </p:blipFill>
+        <p:spPr>
+          <a:xfrm>
+            <a:off x="491279" y="14514"/>
+            <a:ext cx="7515616" cy="6858000"/>
+          </a:xfrm>
+          <a:prstGeom prst="rect">
+            <a:avLst/>
+          </a:prstGeom>
+        </p:spPr>
+      </p:pic>
+      <p:pic>
+        <p:nvPicPr>
+          <p:cNvPr id="5" name="Immagine 4">
+            <a:extLst>
+              <a:ext uri="{FF2B5EF4-FFF2-40B4-BE49-F238E27FC236}">
+                <a16:creationId xmlns:a16="http://schemas.microsoft.com/office/drawing/2014/main" id="{4285E729-F545-4FF9-89A4-FB2DB55868BF}"/>
+              </a:ext>
+            </a:extLst>
+          </p:cNvPr>
+          <p:cNvPicPr>
+            <a:picLocks noChangeAspect="1"/>
+          </p:cNvPicPr>
+          <p:nvPr/>
+        </p:nvPicPr>
+        <p:blipFill>
+          <a:blip r:embed="rId3"/>
+          <a:stretch>
+            <a:fillRect/>
+          </a:stretch>
+        </p:blipFill>
+        <p:spPr>
+          <a:xfrm>
+            <a:off x="5071735" y="1409990"/>
+            <a:ext cx="178729" cy="298885"/>
+          </a:xfrm>
+          <a:prstGeom prst="rect">
+            <a:avLst/>
+          </a:prstGeom>
+        </p:spPr>
+      </p:pic>
+      <p:pic>
+        <p:nvPicPr>
+          <p:cNvPr id="6" name="Immagine 5">
+            <a:extLst>
+              <a:ext uri="{FF2B5EF4-FFF2-40B4-BE49-F238E27FC236}">
+                <a16:creationId xmlns:a16="http://schemas.microsoft.com/office/drawing/2014/main" id="{3FA6500B-430A-4E34-AFF9-AD2C621A47AC}"/>
+              </a:ext>
+            </a:extLst>
+          </p:cNvPr>
+          <p:cNvPicPr>
+            <a:picLocks noChangeAspect="1"/>
+          </p:cNvPicPr>
+          <p:nvPr/>
+        </p:nvPicPr>
+        <p:blipFill>
+          <a:blip r:embed="rId4"/>
+          <a:stretch>
+            <a:fillRect/>
+          </a:stretch>
+        </p:blipFill>
+        <p:spPr>
+          <a:xfrm>
+            <a:off x="3290531" y="1409989"/>
+            <a:ext cx="183087" cy="298885"/>
+          </a:xfrm>
+          <a:prstGeom prst="rect">
+            <a:avLst/>
+          </a:prstGeom>
+        </p:spPr>
+      </p:pic>
+      <p:pic>
+        <p:nvPicPr>
+          <p:cNvPr id="7" name="Immagine 6">
+            <a:extLst>
+              <a:ext uri="{FF2B5EF4-FFF2-40B4-BE49-F238E27FC236}">
+                <a16:creationId xmlns:a16="http://schemas.microsoft.com/office/drawing/2014/main" id="{95FF3219-F1D1-4886-9DE1-3A7176D42206}"/>
+              </a:ext>
+            </a:extLst>
+          </p:cNvPr>
+          <p:cNvPicPr>
+            <a:picLocks noChangeAspect="1"/>
+          </p:cNvPicPr>
+          <p:nvPr/>
+        </p:nvPicPr>
+        <p:blipFill>
+          <a:blip r:embed="rId5"/>
+          <a:stretch>
+            <a:fillRect/>
+          </a:stretch>
+        </p:blipFill>
+        <p:spPr>
+          <a:xfrm flipH="1">
+            <a:off x="3303821" y="3612895"/>
+            <a:ext cx="166923" cy="293661"/>
+          </a:xfrm>
+          <a:prstGeom prst="rect">
+            <a:avLst/>
+          </a:prstGeom>
+        </p:spPr>
+      </p:pic>
+      <p:pic>
+        <p:nvPicPr>
+          <p:cNvPr id="8" name="Immagine 7">
+            <a:extLst>
+              <a:ext uri="{FF2B5EF4-FFF2-40B4-BE49-F238E27FC236}">
+                <a16:creationId xmlns:a16="http://schemas.microsoft.com/office/drawing/2014/main" id="{0D2985A6-56F8-40C2-ADE3-F8B925438319}"/>
+              </a:ext>
+            </a:extLst>
+          </p:cNvPr>
+          <p:cNvPicPr>
+            <a:picLocks noChangeAspect="1"/>
+          </p:cNvPicPr>
+          <p:nvPr/>
+        </p:nvPicPr>
+        <p:blipFill>
+          <a:blip r:embed="rId6"/>
+          <a:stretch>
+            <a:fillRect/>
+          </a:stretch>
+        </p:blipFill>
+        <p:spPr>
+          <a:xfrm>
+            <a:off x="5074397" y="3594607"/>
+            <a:ext cx="181673" cy="307076"/>
+          </a:xfrm>
+          <a:prstGeom prst="rect">
+            <a:avLst/>
+          </a:prstGeom>
+        </p:spPr>
+      </p:pic>
+      <p:pic>
+        <p:nvPicPr>
+          <p:cNvPr id="9" name="Immagine 8">
+            <a:extLst>
+              <a:ext uri="{FF2B5EF4-FFF2-40B4-BE49-F238E27FC236}">
+                <a16:creationId xmlns:a16="http://schemas.microsoft.com/office/drawing/2014/main" id="{6326E622-0661-43D1-BCD0-90ECD428114A}"/>
+              </a:ext>
+            </a:extLst>
+          </p:cNvPr>
+          <p:cNvPicPr>
+            <a:picLocks noChangeAspect="1"/>
+          </p:cNvPicPr>
+          <p:nvPr/>
+        </p:nvPicPr>
+        <p:blipFill>
+          <a:blip r:embed="rId7"/>
+          <a:stretch>
+            <a:fillRect/>
+          </a:stretch>
+        </p:blipFill>
+        <p:spPr>
+          <a:xfrm>
+            <a:off x="5074397" y="2806365"/>
+            <a:ext cx="166923" cy="307076"/>
+          </a:xfrm>
+          <a:prstGeom prst="rect">
+            <a:avLst/>
+          </a:prstGeom>
+        </p:spPr>
+      </p:pic>
+      <p:pic>
+        <p:nvPicPr>
+          <p:cNvPr id="10" name="Immagine 9">
+            <a:extLst>
+              <a:ext uri="{FF2B5EF4-FFF2-40B4-BE49-F238E27FC236}">
+                <a16:creationId xmlns:a16="http://schemas.microsoft.com/office/drawing/2014/main" id="{2044BC45-4432-4F36-A862-E8E358E935CC}"/>
+              </a:ext>
+            </a:extLst>
+          </p:cNvPr>
+          <p:cNvPicPr>
+            <a:picLocks noChangeAspect="1"/>
+          </p:cNvPicPr>
+          <p:nvPr/>
+        </p:nvPicPr>
+        <p:blipFill>
+          <a:blip r:embed="rId8"/>
+          <a:stretch>
+            <a:fillRect/>
+          </a:stretch>
+        </p:blipFill>
+        <p:spPr>
+          <a:xfrm>
+            <a:off x="4015194" y="2426962"/>
+            <a:ext cx="348097" cy="213485"/>
+          </a:xfrm>
+          <a:prstGeom prst="rect">
+            <a:avLst/>
+          </a:prstGeom>
+        </p:spPr>
+      </p:pic>
+      <p:pic>
+        <p:nvPicPr>
+          <p:cNvPr id="15" name="Immagine 14" descr="Immagine che contiene oggetto&#10;&#10;Descrizione generata automaticamente">
+            <a:extLst>
+              <a:ext uri="{FF2B5EF4-FFF2-40B4-BE49-F238E27FC236}">
+                <a16:creationId xmlns:a16="http://schemas.microsoft.com/office/drawing/2014/main" id="{7E03FBB7-2BAC-4D96-8804-B33D7B3FDE96}"/>
+              </a:ext>
+            </a:extLst>
+          </p:cNvPr>
+          <p:cNvPicPr>
+            <a:picLocks noChangeAspect="1"/>
+          </p:cNvPicPr>
+          <p:nvPr/>
+        </p:nvPicPr>
+        <p:blipFill>
+          <a:blip r:embed="rId2">
+            <a:extLst>
+              <a:ext uri="{28A0092B-C50C-407E-A947-70E740481C1C}">
+                <a14:useLocalDpi xmlns:a14="http://schemas.microsoft.com/office/drawing/2010/main" val="0"/>
+              </a:ext>
+            </a:extLst>
+          </a:blip>
+          <a:stretch>
+            <a:fillRect/>
+          </a:stretch>
+        </p:blipFill>
+        <p:spPr>
+          <a:xfrm>
+            <a:off x="7706630" y="2511802"/>
+            <a:ext cx="3218065" cy="2936484"/>
+          </a:xfrm>
+          <a:prstGeom prst="rect">
+            <a:avLst/>
+          </a:prstGeom>
+        </p:spPr>
+      </p:pic>
+      <p:pic>
+        <p:nvPicPr>
+          <p:cNvPr id="16" name="Immagine 15">
+            <a:extLst>
+              <a:ext uri="{FF2B5EF4-FFF2-40B4-BE49-F238E27FC236}">
+                <a16:creationId xmlns:a16="http://schemas.microsoft.com/office/drawing/2014/main" id="{022F499E-EF43-4A1B-87D4-0CD57CF16C2E}"/>
+              </a:ext>
+            </a:extLst>
+          </p:cNvPr>
+          <p:cNvPicPr>
+            <a:picLocks noChangeAspect="1"/>
+          </p:cNvPicPr>
+          <p:nvPr/>
+        </p:nvPicPr>
+        <p:blipFill>
+          <a:blip r:embed="rId3"/>
+          <a:stretch>
+            <a:fillRect/>
+          </a:stretch>
+        </p:blipFill>
+        <p:spPr>
+          <a:xfrm>
+            <a:off x="9662830" y="3112348"/>
+            <a:ext cx="76529" cy="127978"/>
+          </a:xfrm>
+          <a:prstGeom prst="rect">
+            <a:avLst/>
+          </a:prstGeom>
+        </p:spPr>
+      </p:pic>
+      <p:pic>
+        <p:nvPicPr>
+          <p:cNvPr id="17" name="Immagine 16">
+            <a:extLst>
+              <a:ext uri="{FF2B5EF4-FFF2-40B4-BE49-F238E27FC236}">
+                <a16:creationId xmlns:a16="http://schemas.microsoft.com/office/drawing/2014/main" id="{C2DA1620-1D26-42CA-BA42-5CBECC700533}"/>
+              </a:ext>
+            </a:extLst>
+          </p:cNvPr>
+          <p:cNvPicPr>
+            <a:picLocks noChangeAspect="1"/>
+          </p:cNvPicPr>
+          <p:nvPr/>
+        </p:nvPicPr>
+        <p:blipFill>
+          <a:blip r:embed="rId4"/>
+          <a:stretch>
+            <a:fillRect/>
+          </a:stretch>
+        </p:blipFill>
+        <p:spPr>
+          <a:xfrm>
+            <a:off x="8908935" y="3112348"/>
+            <a:ext cx="78395" cy="127978"/>
+          </a:xfrm>
+          <a:prstGeom prst="rect">
+            <a:avLst/>
+          </a:prstGeom>
+        </p:spPr>
+      </p:pic>
+      <p:pic>
+        <p:nvPicPr>
+          <p:cNvPr id="18" name="Immagine 17">
+            <a:extLst>
+              <a:ext uri="{FF2B5EF4-FFF2-40B4-BE49-F238E27FC236}">
+                <a16:creationId xmlns:a16="http://schemas.microsoft.com/office/drawing/2014/main" id="{F87F0ED0-B544-4A67-9682-4700DA2FE7A8}"/>
+              </a:ext>
+            </a:extLst>
+          </p:cNvPr>
+          <p:cNvPicPr>
+            <a:picLocks noChangeAspect="1"/>
+          </p:cNvPicPr>
+          <p:nvPr/>
+        </p:nvPicPr>
+        <p:blipFill>
+          <a:blip r:embed="rId5"/>
+          <a:stretch>
+            <a:fillRect/>
+          </a:stretch>
+        </p:blipFill>
+        <p:spPr>
+          <a:xfrm flipH="1">
+            <a:off x="8911569" y="4058500"/>
+            <a:ext cx="71474" cy="125741"/>
+          </a:xfrm>
+          <a:prstGeom prst="rect">
+            <a:avLst/>
+          </a:prstGeom>
+        </p:spPr>
+      </p:pic>
+      <p:pic>
+        <p:nvPicPr>
+          <p:cNvPr id="19" name="Immagine 18">
+            <a:extLst>
+              <a:ext uri="{FF2B5EF4-FFF2-40B4-BE49-F238E27FC236}">
+                <a16:creationId xmlns:a16="http://schemas.microsoft.com/office/drawing/2014/main" id="{7CAA712D-C113-47D5-A4ED-FD94978AB0C7}"/>
+              </a:ext>
+            </a:extLst>
+          </p:cNvPr>
+          <p:cNvPicPr>
+            <a:picLocks noChangeAspect="1"/>
+          </p:cNvPicPr>
+          <p:nvPr/>
+        </p:nvPicPr>
+        <p:blipFill>
+          <a:blip r:embed="rId6"/>
+          <a:stretch>
+            <a:fillRect/>
+          </a:stretch>
+        </p:blipFill>
+        <p:spPr>
+          <a:xfrm>
+            <a:off x="9662830" y="4058500"/>
+            <a:ext cx="77789" cy="131485"/>
+          </a:xfrm>
+          <a:prstGeom prst="rect">
+            <a:avLst/>
+          </a:prstGeom>
+        </p:spPr>
+      </p:pic>
+      <p:pic>
+        <p:nvPicPr>
+          <p:cNvPr id="20" name="Immagine 19">
+            <a:extLst>
+              <a:ext uri="{FF2B5EF4-FFF2-40B4-BE49-F238E27FC236}">
+                <a16:creationId xmlns:a16="http://schemas.microsoft.com/office/drawing/2014/main" id="{258C37C9-7571-4DAC-ACFD-0155487ADEEC}"/>
+              </a:ext>
+            </a:extLst>
+          </p:cNvPr>
+          <p:cNvPicPr>
+            <a:picLocks noChangeAspect="1"/>
+          </p:cNvPicPr>
+          <p:nvPr/>
+        </p:nvPicPr>
+        <p:blipFill>
+          <a:blip r:embed="rId7"/>
+          <a:stretch>
+            <a:fillRect/>
+          </a:stretch>
+        </p:blipFill>
+        <p:spPr>
+          <a:xfrm>
+            <a:off x="9667886" y="3709387"/>
+            <a:ext cx="71473" cy="131485"/>
+          </a:xfrm>
+          <a:prstGeom prst="rect">
+            <a:avLst/>
+          </a:prstGeom>
+        </p:spPr>
+      </p:pic>
+      <p:pic>
+        <p:nvPicPr>
+          <p:cNvPr id="21" name="Immagine 20">
+            <a:extLst>
+              <a:ext uri="{FF2B5EF4-FFF2-40B4-BE49-F238E27FC236}">
+                <a16:creationId xmlns:a16="http://schemas.microsoft.com/office/drawing/2014/main" id="{2420F999-32AF-447E-A731-FE6EB7802E93}"/>
+              </a:ext>
+            </a:extLst>
+          </p:cNvPr>
+          <p:cNvPicPr>
+            <a:picLocks noChangeAspect="1"/>
+          </p:cNvPicPr>
+          <p:nvPr/>
+        </p:nvPicPr>
+        <p:blipFill>
+          <a:blip r:embed="rId8"/>
+          <a:stretch>
+            <a:fillRect/>
+          </a:stretch>
+        </p:blipFill>
+        <p:spPr>
+          <a:xfrm>
+            <a:off x="9214835" y="3548901"/>
+            <a:ext cx="149049" cy="91411"/>
+          </a:xfrm>
+          <a:prstGeom prst="rect">
+            <a:avLst/>
+          </a:prstGeom>
+        </p:spPr>
+      </p:pic>
+      <p:grpSp>
+        <p:nvGrpSpPr>
+          <p:cNvPr id="22" name="Gruppo 21">
+            <a:extLst>
+              <a:ext uri="{FF2B5EF4-FFF2-40B4-BE49-F238E27FC236}">
+                <a16:creationId xmlns:a16="http://schemas.microsoft.com/office/drawing/2014/main" id="{DAE8869A-3416-4A15-8EB4-B0D4932FD0DB}"/>
+              </a:ext>
+            </a:extLst>
+          </p:cNvPr>
+          <p:cNvGrpSpPr/>
+          <p:nvPr/>
+        </p:nvGrpSpPr>
+        <p:grpSpPr>
+          <a:xfrm>
+            <a:off x="10710334" y="2789632"/>
+            <a:ext cx="6122157" cy="1609950"/>
+            <a:chOff x="11014621" y="4943896"/>
+            <a:chExt cx="6122157" cy="1609950"/>
+          </a:xfrm>
+        </p:grpSpPr>
+        <p:pic>
+          <p:nvPicPr>
+            <p:cNvPr id="23" name="Immagine 22">
+              <a:extLst>
+                <a:ext uri="{FF2B5EF4-FFF2-40B4-BE49-F238E27FC236}">
+                  <a16:creationId xmlns:a16="http://schemas.microsoft.com/office/drawing/2014/main" id="{CD3932DC-B02D-404F-AAB2-BE2057C489E6}"/>
+                </a:ext>
+              </a:extLst>
+            </p:cNvPr>
+            <p:cNvPicPr>
+              <a:picLocks noChangeAspect="1"/>
+            </p:cNvPicPr>
+            <p:nvPr/>
+          </p:nvPicPr>
+          <p:blipFill>
+            <a:blip r:embed="rId9"/>
+            <a:stretch>
+              <a:fillRect/>
+            </a:stretch>
+          </p:blipFill>
+          <p:spPr>
+            <a:xfrm>
+              <a:off x="14821880" y="5009419"/>
+              <a:ext cx="2314898" cy="1533739"/>
+            </a:xfrm>
+            <a:prstGeom prst="rect">
+              <a:avLst/>
+            </a:prstGeom>
+          </p:spPr>
+        </p:pic>
+        <p:pic>
+          <p:nvPicPr>
+            <p:cNvPr id="24" name="Immagine 23">
+              <a:extLst>
+                <a:ext uri="{FF2B5EF4-FFF2-40B4-BE49-F238E27FC236}">
+                  <a16:creationId xmlns:a16="http://schemas.microsoft.com/office/drawing/2014/main" id="{F20DEB31-073C-41C6-9C0E-EEA28453ABBC}"/>
+                </a:ext>
+              </a:extLst>
+            </p:cNvPr>
+            <p:cNvPicPr>
+              <a:picLocks noChangeAspect="1"/>
+            </p:cNvPicPr>
+            <p:nvPr/>
+          </p:nvPicPr>
+          <p:blipFill>
+            <a:blip r:embed="rId10"/>
+            <a:stretch>
+              <a:fillRect/>
+            </a:stretch>
+          </p:blipFill>
+          <p:spPr>
+            <a:xfrm>
+              <a:off x="11014621" y="4943896"/>
+              <a:ext cx="3820058" cy="1609950"/>
+            </a:xfrm>
+            <a:prstGeom prst="rect">
+              <a:avLst/>
+            </a:prstGeom>
+          </p:spPr>
+        </p:pic>
+      </p:grpSp>
+      <p:sp>
+        <p:nvSpPr>
+          <p:cNvPr id="14" name="Rettangolo 13">
+            <a:extLst>
+              <a:ext uri="{FF2B5EF4-FFF2-40B4-BE49-F238E27FC236}">
+                <a16:creationId xmlns:a16="http://schemas.microsoft.com/office/drawing/2014/main" id="{935A8FC4-34FC-4556-AE9B-84FAA06D3494}"/>
+              </a:ext>
+            </a:extLst>
+          </p:cNvPr>
+          <p:cNvSpPr/>
+          <p:nvPr/>
+        </p:nvSpPr>
+        <p:spPr>
+          <a:xfrm>
+            <a:off x="7829348" y="4766992"/>
+            <a:ext cx="3218065" cy="840036"/>
+          </a:xfrm>
+          <a:prstGeom prst="rect">
+            <a:avLst/>
+          </a:prstGeom>
+          <a:solidFill>
+            <a:schemeClr val="bg1"/>
+          </a:solidFill>
+          <a:ln>
+            <a:noFill/>
+          </a:ln>
+        </p:spPr>
+        <p:style>
+          <a:lnRef idx="2">
+            <a:schemeClr val="accent1">
+              <a:shade val="50000"/>
+            </a:schemeClr>
+          </a:lnRef>
+          <a:fillRef idx="1">
+            <a:schemeClr val="accent1"/>
+          </a:fillRef>
+          <a:effectRef idx="0">
+            <a:schemeClr val="accent1"/>
+          </a:effectRef>
+          <a:fontRef idx="minor">
+            <a:schemeClr val="lt1"/>
+          </a:fontRef>
+        </p:style>
+        <p:txBody>
+          <a:bodyPr rtlCol="0" anchor="ctr"/>
+          <a:lstStyle/>
+          <a:p>
+            <a:pPr algn="ctr"/>
+            <a:endParaRPr lang="en-US"/>
+          </a:p>
+        </p:txBody>
+      </p:sp>
+      <p:sp>
+        <p:nvSpPr>
+          <p:cNvPr id="25" name="Rettangolo 24">
+            <a:extLst>
+              <a:ext uri="{FF2B5EF4-FFF2-40B4-BE49-F238E27FC236}">
+                <a16:creationId xmlns:a16="http://schemas.microsoft.com/office/drawing/2014/main" id="{B638AED5-FBB0-47DE-A24A-9868066E9B9D}"/>
+              </a:ext>
+            </a:extLst>
+          </p:cNvPr>
+          <p:cNvSpPr/>
+          <p:nvPr/>
+        </p:nvSpPr>
+        <p:spPr>
+          <a:xfrm>
+            <a:off x="364904" y="5065228"/>
+            <a:ext cx="7648676" cy="2150861"/>
+          </a:xfrm>
+          <a:prstGeom prst="rect">
+            <a:avLst/>
+          </a:prstGeom>
+          <a:solidFill>
+            <a:schemeClr val="bg1"/>
+          </a:solidFill>
+          <a:ln>
+            <a:noFill/>
+          </a:ln>
+        </p:spPr>
+        <p:style>
+          <a:lnRef idx="2">
+            <a:schemeClr val="accent1">
+              <a:shade val="50000"/>
+            </a:schemeClr>
+          </a:lnRef>
+          <a:fillRef idx="1">
+            <a:schemeClr val="accent1"/>
+          </a:fillRef>
+          <a:effectRef idx="0">
+            <a:schemeClr val="accent1"/>
+          </a:effectRef>
+          <a:fontRef idx="minor">
+            <a:schemeClr val="lt1"/>
+          </a:fontRef>
+        </p:style>
+        <p:txBody>
+          <a:bodyPr rtlCol="0" anchor="ctr"/>
+          <a:lstStyle/>
+          <a:p>
+            <a:pPr algn="ctr"/>
+            <a:endParaRPr lang="en-US"/>
+          </a:p>
+        </p:txBody>
+      </p:sp>
+      <p:grpSp>
+        <p:nvGrpSpPr>
+          <p:cNvPr id="11" name="Gruppo 10">
+            <a:extLst>
+              <a:ext uri="{FF2B5EF4-FFF2-40B4-BE49-F238E27FC236}">
+                <a16:creationId xmlns:a16="http://schemas.microsoft.com/office/drawing/2014/main" id="{8B82A054-51F0-4610-8E8C-F42C646A14C8}"/>
+              </a:ext>
+            </a:extLst>
+          </p:cNvPr>
+          <p:cNvGrpSpPr/>
+          <p:nvPr/>
+        </p:nvGrpSpPr>
+        <p:grpSpPr>
+          <a:xfrm>
+            <a:off x="1323867" y="5220904"/>
+            <a:ext cx="6122157" cy="1609950"/>
+            <a:chOff x="11014621" y="4943896"/>
+            <a:chExt cx="6122157" cy="1609950"/>
+          </a:xfrm>
+        </p:grpSpPr>
+        <p:pic>
+          <p:nvPicPr>
+            <p:cNvPr id="12" name="Immagine 11">
+              <a:extLst>
+                <a:ext uri="{FF2B5EF4-FFF2-40B4-BE49-F238E27FC236}">
+                  <a16:creationId xmlns:a16="http://schemas.microsoft.com/office/drawing/2014/main" id="{289A588F-6521-4983-B2BF-C529B4F40F12}"/>
+                </a:ext>
+              </a:extLst>
+            </p:cNvPr>
+            <p:cNvPicPr>
+              <a:picLocks noChangeAspect="1"/>
+            </p:cNvPicPr>
+            <p:nvPr/>
+          </p:nvPicPr>
+          <p:blipFill>
+            <a:blip r:embed="rId9"/>
+            <a:stretch>
+              <a:fillRect/>
+            </a:stretch>
+          </p:blipFill>
+          <p:spPr>
+            <a:xfrm>
+              <a:off x="14821880" y="5009419"/>
+              <a:ext cx="2314898" cy="1533739"/>
+            </a:xfrm>
+            <a:prstGeom prst="rect">
+              <a:avLst/>
+            </a:prstGeom>
+          </p:spPr>
+        </p:pic>
+        <p:pic>
+          <p:nvPicPr>
+            <p:cNvPr id="13" name="Immagine 12">
+              <a:extLst>
+                <a:ext uri="{FF2B5EF4-FFF2-40B4-BE49-F238E27FC236}">
+                  <a16:creationId xmlns:a16="http://schemas.microsoft.com/office/drawing/2014/main" id="{D91A081D-60CC-4017-B230-12266C1E4360}"/>
+                </a:ext>
+              </a:extLst>
+            </p:cNvPr>
+            <p:cNvPicPr>
+              <a:picLocks noChangeAspect="1"/>
+            </p:cNvPicPr>
+            <p:nvPr/>
+          </p:nvPicPr>
+          <p:blipFill>
+            <a:blip r:embed="rId10"/>
+            <a:stretch>
+              <a:fillRect/>
+            </a:stretch>
+          </p:blipFill>
+          <p:spPr>
+            <a:xfrm>
+              <a:off x="11014621" y="4943896"/>
+              <a:ext cx="3820058" cy="1609950"/>
+            </a:xfrm>
+            <a:prstGeom prst="rect">
+              <a:avLst/>
+            </a:prstGeom>
+          </p:spPr>
+        </p:pic>
+      </p:grpSp>
+    </p:spTree>
+    <p:extLst>
+      <p:ext uri="{BB962C8B-B14F-4D97-AF65-F5344CB8AC3E}">
+        <p14:creationId xmlns:p14="http://schemas.microsoft.com/office/powerpoint/2010/main" val="3246022540"/>
+      </p:ext>
+    </p:extLst>
+  </p:cSld>
+  <p:clrMapOvr>
+    <a:masterClrMapping/>
+  </p:clrMapOvr>
+</p:sld>
+</file>
+
+<file path=ppt/slides/slide5.xml><?xml version="1.0" encoding="utf-8"?>
+<p:sld xmlns:a="http://schemas.openxmlformats.org/drawingml/2006/main" xmlns:r="http://schemas.openxmlformats.org/officeDocument/2006/relationships" xmlns:p="http://schemas.openxmlformats.org/presentationml/2006/main">
+  <p:cSld>
+    <p:spTree>
+      <p:nvGrpSpPr>
+        <p:cNvPr id="1" name=""/>
+        <p:cNvGrpSpPr/>
+        <p:nvPr/>
+      </p:nvGrpSpPr>
+      <p:grpSpPr>
+        <a:xfrm>
+          <a:off x="0" y="0"/>
+          <a:ext cx="0" cy="0"/>
+          <a:chOff x="0" y="0"/>
+          <a:chExt cx="0" cy="0"/>
+        </a:xfrm>
+      </p:grpSpPr>
+      <p:sp>
+        <p:nvSpPr>
+          <p:cNvPr id="2" name="Rettangolo 1">
+            <a:extLst>
+              <a:ext uri="{FF2B5EF4-FFF2-40B4-BE49-F238E27FC236}">
+                <a16:creationId xmlns:a16="http://schemas.microsoft.com/office/drawing/2014/main" id="{A5F85056-BF66-41B2-836A-38DF1FE79D98}"/>
+              </a:ext>
+            </a:extLst>
+          </p:cNvPr>
+          <p:cNvSpPr/>
+          <p:nvPr/>
+        </p:nvSpPr>
+        <p:spPr>
+          <a:xfrm>
+            <a:off x="-2133600" y="-1959429"/>
+            <a:ext cx="19521714" cy="11205029"/>
+          </a:xfrm>
+          <a:prstGeom prst="rect">
+            <a:avLst/>
+          </a:prstGeom>
+          <a:solidFill>
+            <a:schemeClr val="bg1"/>
+          </a:solidFill>
+          <a:ln>
+            <a:noFill/>
+          </a:ln>
+        </p:spPr>
+        <p:style>
+          <a:lnRef idx="2">
+            <a:schemeClr val="accent1">
+              <a:shade val="50000"/>
+            </a:schemeClr>
+          </a:lnRef>
+          <a:fillRef idx="1">
+            <a:schemeClr val="accent1"/>
+          </a:fillRef>
+          <a:effectRef idx="0">
+            <a:schemeClr val="accent1"/>
+          </a:effectRef>
+          <a:fontRef idx="minor">
+            <a:schemeClr val="lt1"/>
+          </a:fontRef>
+        </p:style>
+        <p:txBody>
+          <a:bodyPr rtlCol="0" anchor="ctr"/>
+          <a:lstStyle/>
+          <a:p>
+            <a:pPr algn="ctr"/>
+            <a:endParaRPr lang="en-US"/>
+          </a:p>
+        </p:txBody>
+      </p:sp>
+      <p:pic>
+        <p:nvPicPr>
+          <p:cNvPr id="4" name="Immagine 3" descr="Immagine che contiene oggetto&#10;&#10;Descrizione generata automaticamente">
+            <a:extLst>
+              <a:ext uri="{FF2B5EF4-FFF2-40B4-BE49-F238E27FC236}">
+                <a16:creationId xmlns:a16="http://schemas.microsoft.com/office/drawing/2014/main" id="{F6907E33-2699-40F3-BC16-7A4F5F2B0E13}"/>
+              </a:ext>
+            </a:extLst>
+          </p:cNvPr>
+          <p:cNvPicPr>
+            <a:picLocks noChangeAspect="1"/>
+          </p:cNvPicPr>
+          <p:nvPr/>
+        </p:nvPicPr>
+        <p:blipFill>
+          <a:blip r:embed="rId2">
+            <a:extLst>
+              <a:ext uri="{28A0092B-C50C-407E-A947-70E740481C1C}">
+                <a14:useLocalDpi xmlns:a14="http://schemas.microsoft.com/office/drawing/2010/main" val="0"/>
+              </a:ext>
+            </a:extLst>
+          </a:blip>
+          <a:stretch>
+            <a:fillRect/>
+          </a:stretch>
+        </p:blipFill>
+        <p:spPr>
+          <a:xfrm>
+            <a:off x="491279" y="0"/>
+            <a:ext cx="7515616" cy="6858000"/>
+          </a:xfrm>
+          <a:prstGeom prst="rect">
+            <a:avLst/>
+          </a:prstGeom>
+        </p:spPr>
+      </p:pic>
+      <p:sp>
+        <p:nvSpPr>
+          <p:cNvPr id="14" name="Rettangolo 13">
+            <a:extLst>
+              <a:ext uri="{FF2B5EF4-FFF2-40B4-BE49-F238E27FC236}">
+                <a16:creationId xmlns:a16="http://schemas.microsoft.com/office/drawing/2014/main" id="{935A8FC4-34FC-4556-AE9B-84FAA06D3494}"/>
+              </a:ext>
+            </a:extLst>
+          </p:cNvPr>
+          <p:cNvSpPr/>
+          <p:nvPr/>
+        </p:nvSpPr>
+        <p:spPr>
+          <a:xfrm>
+            <a:off x="190856" y="5159623"/>
+            <a:ext cx="7648676" cy="2150861"/>
+          </a:xfrm>
+          <a:prstGeom prst="rect">
+            <a:avLst/>
+          </a:prstGeom>
+          <a:solidFill>
+            <a:schemeClr val="bg1"/>
+          </a:solidFill>
+          <a:ln>
+            <a:noFill/>
+          </a:ln>
+        </p:spPr>
+        <p:style>
+          <a:lnRef idx="2">
+            <a:schemeClr val="accent1">
+              <a:shade val="50000"/>
+            </a:schemeClr>
+          </a:lnRef>
+          <a:fillRef idx="1">
+            <a:schemeClr val="accent1"/>
+          </a:fillRef>
+          <a:effectRef idx="0">
+            <a:schemeClr val="accent1"/>
+          </a:effectRef>
+          <a:fontRef idx="minor">
+            <a:schemeClr val="lt1"/>
+          </a:fontRef>
+        </p:style>
+        <p:txBody>
+          <a:bodyPr rtlCol="0" anchor="ctr"/>
+          <a:lstStyle/>
+          <a:p>
+            <a:pPr algn="ctr"/>
+            <a:endParaRPr lang="en-US"/>
+          </a:p>
+        </p:txBody>
+      </p:sp>
+      <p:grpSp>
+        <p:nvGrpSpPr>
+          <p:cNvPr id="11" name="Gruppo 10">
+            <a:extLst>
+              <a:ext uri="{FF2B5EF4-FFF2-40B4-BE49-F238E27FC236}">
+                <a16:creationId xmlns:a16="http://schemas.microsoft.com/office/drawing/2014/main" id="{8B82A054-51F0-4610-8E8C-F42C646A14C8}"/>
+              </a:ext>
+            </a:extLst>
+          </p:cNvPr>
+          <p:cNvGrpSpPr/>
+          <p:nvPr/>
+        </p:nvGrpSpPr>
+        <p:grpSpPr>
+          <a:xfrm>
+            <a:off x="1323867" y="5220904"/>
+            <a:ext cx="6122157" cy="1609950"/>
+            <a:chOff x="11014621" y="4943896"/>
+            <a:chExt cx="6122157" cy="1609950"/>
+          </a:xfrm>
+        </p:grpSpPr>
+        <p:pic>
+          <p:nvPicPr>
+            <p:cNvPr id="12" name="Immagine 11">
+              <a:extLst>
+                <a:ext uri="{FF2B5EF4-FFF2-40B4-BE49-F238E27FC236}">
+                  <a16:creationId xmlns:a16="http://schemas.microsoft.com/office/drawing/2014/main" id="{289A588F-6521-4983-B2BF-C529B4F40F12}"/>
+                </a:ext>
+              </a:extLst>
+            </p:cNvPr>
+            <p:cNvPicPr>
+              <a:picLocks noChangeAspect="1"/>
+            </p:cNvPicPr>
+            <p:nvPr/>
+          </p:nvPicPr>
+          <p:blipFill>
+            <a:blip r:embed="rId3"/>
+            <a:stretch>
+              <a:fillRect/>
+            </a:stretch>
+          </p:blipFill>
+          <p:spPr>
+            <a:xfrm>
+              <a:off x="14821880" y="5009419"/>
+              <a:ext cx="2314898" cy="1533739"/>
+            </a:xfrm>
+            <a:prstGeom prst="rect">
+              <a:avLst/>
+            </a:prstGeom>
+          </p:spPr>
+        </p:pic>
+        <p:pic>
+          <p:nvPicPr>
+            <p:cNvPr id="13" name="Immagine 12">
+              <a:extLst>
+                <a:ext uri="{FF2B5EF4-FFF2-40B4-BE49-F238E27FC236}">
+                  <a16:creationId xmlns:a16="http://schemas.microsoft.com/office/drawing/2014/main" id="{D91A081D-60CC-4017-B230-12266C1E4360}"/>
+                </a:ext>
+              </a:extLst>
+            </p:cNvPr>
+            <p:cNvPicPr>
+              <a:picLocks noChangeAspect="1"/>
+            </p:cNvPicPr>
+            <p:nvPr/>
+          </p:nvPicPr>
+          <p:blipFill>
+            <a:blip r:embed="rId4"/>
+            <a:stretch>
+              <a:fillRect/>
+            </a:stretch>
+          </p:blipFill>
+          <p:spPr>
+            <a:xfrm>
+              <a:off x="11014621" y="4943896"/>
+              <a:ext cx="3820058" cy="1609950"/>
+            </a:xfrm>
+            <a:prstGeom prst="rect">
+              <a:avLst/>
+            </a:prstGeom>
+          </p:spPr>
+        </p:pic>
+      </p:grpSp>
+      <p:pic>
+        <p:nvPicPr>
+          <p:cNvPr id="15" name="Immagine 14" descr="Immagine che contiene oggetto&#10;&#10;Descrizione generata automaticamente">
+            <a:extLst>
+              <a:ext uri="{FF2B5EF4-FFF2-40B4-BE49-F238E27FC236}">
+                <a16:creationId xmlns:a16="http://schemas.microsoft.com/office/drawing/2014/main" id="{2E9E8F15-AD56-4D7B-A9A0-E9B82FDD1B7E}"/>
+              </a:ext>
+            </a:extLst>
+          </p:cNvPr>
+          <p:cNvPicPr>
+            <a:picLocks noChangeAspect="1"/>
+          </p:cNvPicPr>
+          <p:nvPr/>
+        </p:nvPicPr>
+        <p:blipFill>
+          <a:blip r:embed="rId2">
+            <a:extLst>
+              <a:ext uri="{28A0092B-C50C-407E-A947-70E740481C1C}">
+                <a14:useLocalDpi xmlns:a14="http://schemas.microsoft.com/office/drawing/2010/main" val="0"/>
+              </a:ext>
+            </a:extLst>
+          </a:blip>
+          <a:stretch>
+            <a:fillRect/>
+          </a:stretch>
+        </p:blipFill>
+        <p:spPr>
+          <a:xfrm>
+            <a:off x="7706630" y="2511802"/>
+            <a:ext cx="3218065" cy="2936484"/>
+          </a:xfrm>
+          <a:prstGeom prst="rect">
+            <a:avLst/>
+          </a:prstGeom>
+        </p:spPr>
+      </p:pic>
+      <p:grpSp>
+        <p:nvGrpSpPr>
+          <p:cNvPr id="16" name="Gruppo 15">
+            <a:extLst>
+              <a:ext uri="{FF2B5EF4-FFF2-40B4-BE49-F238E27FC236}">
+                <a16:creationId xmlns:a16="http://schemas.microsoft.com/office/drawing/2014/main" id="{13806F4E-41E1-49E1-AF73-B71A4410B3D1}"/>
+              </a:ext>
+            </a:extLst>
+          </p:cNvPr>
+          <p:cNvGrpSpPr/>
+          <p:nvPr/>
+        </p:nvGrpSpPr>
+        <p:grpSpPr>
+          <a:xfrm>
+            <a:off x="10710334" y="2789632"/>
+            <a:ext cx="6122157" cy="1609950"/>
+            <a:chOff x="11014621" y="4943896"/>
+            <a:chExt cx="6122157" cy="1609950"/>
+          </a:xfrm>
+        </p:grpSpPr>
+        <p:pic>
+          <p:nvPicPr>
+            <p:cNvPr id="17" name="Immagine 16">
+              <a:extLst>
+                <a:ext uri="{FF2B5EF4-FFF2-40B4-BE49-F238E27FC236}">
+                  <a16:creationId xmlns:a16="http://schemas.microsoft.com/office/drawing/2014/main" id="{5ACC4943-B1D2-48FA-A443-09D184182337}"/>
+                </a:ext>
+              </a:extLst>
+            </p:cNvPr>
+            <p:cNvPicPr>
+              <a:picLocks noChangeAspect="1"/>
+            </p:cNvPicPr>
+            <p:nvPr/>
+          </p:nvPicPr>
+          <p:blipFill>
+            <a:blip r:embed="rId3"/>
+            <a:stretch>
+              <a:fillRect/>
+            </a:stretch>
+          </p:blipFill>
+          <p:spPr>
+            <a:xfrm>
+              <a:off x="14821880" y="5009419"/>
+              <a:ext cx="2314898" cy="1533739"/>
+            </a:xfrm>
+            <a:prstGeom prst="rect">
+              <a:avLst/>
+            </a:prstGeom>
+          </p:spPr>
+        </p:pic>
+        <p:pic>
+          <p:nvPicPr>
+            <p:cNvPr id="18" name="Immagine 17">
+              <a:extLst>
+                <a:ext uri="{FF2B5EF4-FFF2-40B4-BE49-F238E27FC236}">
+                  <a16:creationId xmlns:a16="http://schemas.microsoft.com/office/drawing/2014/main" id="{2A04C173-EAB6-429E-B382-4CEC4AB0008E}"/>
+                </a:ext>
+              </a:extLst>
+            </p:cNvPr>
+            <p:cNvPicPr>
+              <a:picLocks noChangeAspect="1"/>
+            </p:cNvPicPr>
+            <p:nvPr/>
+          </p:nvPicPr>
+          <p:blipFill>
+            <a:blip r:embed="rId4"/>
+            <a:stretch>
+              <a:fillRect/>
+            </a:stretch>
+          </p:blipFill>
+          <p:spPr>
+            <a:xfrm>
+              <a:off x="11014621" y="4943896"/>
+              <a:ext cx="3820058" cy="1609950"/>
+            </a:xfrm>
+            <a:prstGeom prst="rect">
+              <a:avLst/>
+            </a:prstGeom>
+          </p:spPr>
+        </p:pic>
+      </p:grpSp>
+      <p:sp>
+        <p:nvSpPr>
+          <p:cNvPr id="19" name="Rettangolo 18">
+            <a:extLst>
+              <a:ext uri="{FF2B5EF4-FFF2-40B4-BE49-F238E27FC236}">
+                <a16:creationId xmlns:a16="http://schemas.microsoft.com/office/drawing/2014/main" id="{FF1F6CA5-70AB-4FB1-BD83-86F2023DE9FC}"/>
+              </a:ext>
+            </a:extLst>
+          </p:cNvPr>
+          <p:cNvSpPr/>
+          <p:nvPr/>
+        </p:nvSpPr>
+        <p:spPr>
+          <a:xfrm>
+            <a:off x="7829348" y="4766992"/>
+            <a:ext cx="3218065" cy="840036"/>
+          </a:xfrm>
+          <a:prstGeom prst="rect">
+            <a:avLst/>
+          </a:prstGeom>
+          <a:solidFill>
+            <a:schemeClr val="bg1"/>
+          </a:solidFill>
+          <a:ln>
+            <a:noFill/>
+          </a:ln>
+        </p:spPr>
+        <p:style>
+          <a:lnRef idx="2">
+            <a:schemeClr val="accent1">
+              <a:shade val="50000"/>
+            </a:schemeClr>
+          </a:lnRef>
+          <a:fillRef idx="1">
+            <a:schemeClr val="accent1"/>
+          </a:fillRef>
+          <a:effectRef idx="0">
+            <a:schemeClr val="accent1"/>
+          </a:effectRef>
+          <a:fontRef idx="minor">
+            <a:schemeClr val="lt1"/>
+          </a:fontRef>
+        </p:style>
+        <p:txBody>
+          <a:bodyPr rtlCol="0" anchor="ctr"/>
+          <a:lstStyle/>
+          <a:p>
+            <a:pPr algn="ctr"/>
+            <a:endParaRPr lang="en-US"/>
+          </a:p>
+        </p:txBody>
+      </p:sp>
+    </p:spTree>
+    <p:extLst>
+      <p:ext uri="{BB962C8B-B14F-4D97-AF65-F5344CB8AC3E}">
+        <p14:creationId xmlns:p14="http://schemas.microsoft.com/office/powerpoint/2010/main" val="1332200373"/>
       </p:ext>
     </p:extLst>
   </p:cSld>

</xml_diff>